<commit_message>
Uploaded all project files
</commit_message>
<xml_diff>
--- a/PHASE_D/Final Project/FInal Project - High Altitude Balloon Payload.pptx
+++ b/PHASE_D/Final Project/FInal Project - High Altitude Balloon Payload.pptx
@@ -18,35 +18,37 @@
     <p:sldId id="263" r:id="rId13"/>
     <p:sldId id="264" r:id="rId14"/>
     <p:sldId id="265" r:id="rId15"/>
+    <p:sldId id="266" r:id="rId16"/>
+    <p:sldId id="267" r:id="rId17"/>
   </p:sldIdLst>
   <p:sldSz cy="5143500" cx="9144000"/>
   <p:notesSz cx="6858000" cy="9144000"/>
   <p:embeddedFontLst>
     <p:embeddedFont>
       <p:font typeface="Inter SemiBold"/>
-      <p:regular r:id="rId16"/>
-      <p:bold r:id="rId17"/>
-      <p:italic r:id="rId18"/>
-      <p:boldItalic r:id="rId19"/>
+      <p:regular r:id="rId18"/>
+      <p:bold r:id="rId19"/>
+      <p:italic r:id="rId20"/>
+      <p:boldItalic r:id="rId21"/>
     </p:embeddedFont>
     <p:embeddedFont>
       <p:font typeface="Inter Light"/>
-      <p:regular r:id="rId20"/>
-      <p:bold r:id="rId21"/>
-      <p:italic r:id="rId22"/>
-      <p:boldItalic r:id="rId23"/>
+      <p:regular r:id="rId22"/>
+      <p:bold r:id="rId23"/>
+      <p:italic r:id="rId24"/>
+      <p:boldItalic r:id="rId25"/>
     </p:embeddedFont>
     <p:embeddedFont>
       <p:font typeface="Inter"/>
-      <p:regular r:id="rId24"/>
-      <p:bold r:id="rId25"/>
-      <p:italic r:id="rId26"/>
-      <p:boldItalic r:id="rId27"/>
+      <p:regular r:id="rId26"/>
+      <p:bold r:id="rId27"/>
+      <p:italic r:id="rId28"/>
+      <p:boldItalic r:id="rId29"/>
     </p:embeddedFont>
     <p:embeddedFont>
       <p:font typeface="Inter ExtraBold"/>
-      <p:bold r:id="rId28"/>
-      <p:boldItalic r:id="rId29"/>
+      <p:bold r:id="rId30"/>
+      <p:boldItalic r:id="rId31"/>
     </p:embeddedFont>
   </p:embeddedFontLst>
   <p:defaultTextStyle>
@@ -827,7 +829,7 @@
   <p:cSld>
     <p:spTree>
       <p:nvGrpSpPr>
-        <p:cNvPr id="392" name="Shape 392"/>
+        <p:cNvPr id="391" name="Shape 391"/>
         <p:cNvGrpSpPr/>
         <p:nvPr/>
       </p:nvGrpSpPr>
@@ -841,7 +843,7 @@
       </p:grpSpPr>
       <p:sp>
         <p:nvSpPr>
-          <p:cNvPr id="393" name="Google Shape;393;g335bf0e1a43_0_13:notes"/>
+          <p:cNvPr id="392" name="Google Shape;392;g335bf0e1a43_0_1:notes"/>
           <p:cNvSpPr/>
           <p:nvPr>
             <p:ph idx="2" type="sldImg"/>
@@ -876,7 +878,205 @@
       </p:sp>
       <p:sp>
         <p:nvSpPr>
-          <p:cNvPr id="394" name="Google Shape;394;g335bf0e1a43_0_13:notes"/>
+          <p:cNvPr id="393" name="Google Shape;393;g335bf0e1a43_0_1:notes"/>
+          <p:cNvSpPr txBox="1"/>
+          <p:nvPr>
+            <p:ph idx="1" type="body"/>
+          </p:nvPr>
+        </p:nvSpPr>
+        <p:spPr>
+          <a:xfrm>
+            <a:off x="685800" y="4343400"/>
+            <a:ext cx="5486400" cy="4114800"/>
+          </a:xfrm>
+          <a:prstGeom prst="rect">
+            <a:avLst/>
+          </a:prstGeom>
+        </p:spPr>
+        <p:txBody>
+          <a:bodyPr anchorCtr="0" anchor="t" bIns="91425" lIns="91425" spcFirstLastPara="1" rIns="91425" wrap="square" tIns="91425">
+            <a:noAutofit/>
+          </a:bodyPr>
+          <a:lstStyle/>
+          <a:p>
+            <a:pPr indent="0" lvl="0" marL="0" rtl="0" algn="l">
+              <a:spcBef>
+                <a:spcPts val="0"/>
+              </a:spcBef>
+              <a:spcAft>
+                <a:spcPts val="0"/>
+              </a:spcAft>
+              <a:buNone/>
+            </a:pPr>
+            <a:r>
+              <a:t/>
+            </a:r>
+            <a:endParaRPr/>
+          </a:p>
+        </p:txBody>
+      </p:sp>
+    </p:spTree>
+  </p:cSld>
+  <p:clrMapOvr>
+    <a:masterClrMapping/>
+  </p:clrMapOvr>
+</p:notes>
+</file>
+
+<file path=ppt/notesSlides/notesSlide11.xml><?xml version="1.0" encoding="utf-8"?>
+<p:notes xmlns:a="http://schemas.openxmlformats.org/drawingml/2006/main" xmlns:r="http://schemas.openxmlformats.org/officeDocument/2006/relationships" xmlns:mc="http://schemas.openxmlformats.org/markup-compatibility/2006" xmlns:mv="urn:schemas-microsoft-com:mac:vml" xmlns:p="http://schemas.openxmlformats.org/presentationml/2006/main" xmlns:c="http://schemas.openxmlformats.org/drawingml/2006/chart" xmlns:dgm="http://schemas.openxmlformats.org/drawingml/2006/diagram" xmlns:o="urn:schemas-microsoft-com:office:office" xmlns:v="urn:schemas-microsoft-com:vml" xmlns:pvml="urn:schemas-microsoft-com:office:powerpoint" xmlns:com="http://schemas.openxmlformats.org/drawingml/2006/compatibility" xmlns:p14="http://schemas.microsoft.com/office/powerpoint/2010/main" xmlns:p15="http://schemas.microsoft.com/office/powerpoint/2012/main" xmlns:ahyp="http://schemas.microsoft.com/office/drawing/2018/hyperlinkcolor" showMasterPhAnim="0" showMasterSp="0">
+  <p:cSld>
+    <p:spTree>
+      <p:nvGrpSpPr>
+        <p:cNvPr id="397" name="Shape 397"/>
+        <p:cNvGrpSpPr/>
+        <p:nvPr/>
+      </p:nvGrpSpPr>
+      <p:grpSpPr>
+        <a:xfrm>
+          <a:off x="0" y="0"/>
+          <a:ext cx="0" cy="0"/>
+          <a:chOff x="0" y="0"/>
+          <a:chExt cx="0" cy="0"/>
+        </a:xfrm>
+      </p:grpSpPr>
+      <p:sp>
+        <p:nvSpPr>
+          <p:cNvPr id="398" name="Google Shape;398;g335bf0e1a43_0_7:notes"/>
+          <p:cNvSpPr/>
+          <p:nvPr>
+            <p:ph idx="2" type="sldImg"/>
+          </p:nvPr>
+        </p:nvSpPr>
+        <p:spPr>
+          <a:xfrm>
+            <a:off x="381300" y="685800"/>
+            <a:ext cx="6096000" cy="3429000"/>
+          </a:xfrm>
+          <a:custGeom>
+            <a:rect b="b" l="l" r="r" t="t"/>
+            <a:pathLst>
+              <a:path extrusionOk="0" h="120000" w="120000">
+                <a:moveTo>
+                  <a:pt x="0" y="0"/>
+                </a:moveTo>
+                <a:lnTo>
+                  <a:pt x="120000" y="0"/>
+                </a:lnTo>
+                <a:lnTo>
+                  <a:pt x="120000" y="120000"/>
+                </a:lnTo>
+                <a:lnTo>
+                  <a:pt x="0" y="120000"/>
+                </a:lnTo>
+                <a:close/>
+              </a:path>
+            </a:pathLst>
+          </a:custGeom>
+        </p:spPr>
+      </p:sp>
+      <p:sp>
+        <p:nvSpPr>
+          <p:cNvPr id="399" name="Google Shape;399;g335bf0e1a43_0_7:notes"/>
+          <p:cNvSpPr txBox="1"/>
+          <p:nvPr>
+            <p:ph idx="1" type="body"/>
+          </p:nvPr>
+        </p:nvSpPr>
+        <p:spPr>
+          <a:xfrm>
+            <a:off x="685800" y="4343400"/>
+            <a:ext cx="5486400" cy="4114800"/>
+          </a:xfrm>
+          <a:prstGeom prst="rect">
+            <a:avLst/>
+          </a:prstGeom>
+        </p:spPr>
+        <p:txBody>
+          <a:bodyPr anchorCtr="0" anchor="t" bIns="91425" lIns="91425" spcFirstLastPara="1" rIns="91425" wrap="square" tIns="91425">
+            <a:noAutofit/>
+          </a:bodyPr>
+          <a:lstStyle/>
+          <a:p>
+            <a:pPr indent="0" lvl="0" marL="0" rtl="0" algn="l">
+              <a:spcBef>
+                <a:spcPts val="0"/>
+              </a:spcBef>
+              <a:spcAft>
+                <a:spcPts val="0"/>
+              </a:spcAft>
+              <a:buNone/>
+            </a:pPr>
+            <a:r>
+              <a:t/>
+            </a:r>
+            <a:endParaRPr/>
+          </a:p>
+        </p:txBody>
+      </p:sp>
+    </p:spTree>
+  </p:cSld>
+  <p:clrMapOvr>
+    <a:masterClrMapping/>
+  </p:clrMapOvr>
+</p:notes>
+</file>
+
+<file path=ppt/notesSlides/notesSlide12.xml><?xml version="1.0" encoding="utf-8"?>
+<p:notes xmlns:a="http://schemas.openxmlformats.org/drawingml/2006/main" xmlns:r="http://schemas.openxmlformats.org/officeDocument/2006/relationships" xmlns:mc="http://schemas.openxmlformats.org/markup-compatibility/2006" xmlns:mv="urn:schemas-microsoft-com:mac:vml" xmlns:p="http://schemas.openxmlformats.org/presentationml/2006/main" xmlns:c="http://schemas.openxmlformats.org/drawingml/2006/chart" xmlns:dgm="http://schemas.openxmlformats.org/drawingml/2006/diagram" xmlns:o="urn:schemas-microsoft-com:office:office" xmlns:v="urn:schemas-microsoft-com:vml" xmlns:pvml="urn:schemas-microsoft-com:office:powerpoint" xmlns:com="http://schemas.openxmlformats.org/drawingml/2006/compatibility" xmlns:p14="http://schemas.microsoft.com/office/powerpoint/2010/main" xmlns:p15="http://schemas.microsoft.com/office/powerpoint/2012/main" xmlns:ahyp="http://schemas.microsoft.com/office/drawing/2018/hyperlinkcolor" showMasterPhAnim="0" showMasterSp="0">
+  <p:cSld>
+    <p:spTree>
+      <p:nvGrpSpPr>
+        <p:cNvPr id="404" name="Shape 404"/>
+        <p:cNvGrpSpPr/>
+        <p:nvPr/>
+      </p:nvGrpSpPr>
+      <p:grpSpPr>
+        <a:xfrm>
+          <a:off x="0" y="0"/>
+          <a:ext cx="0" cy="0"/>
+          <a:chOff x="0" y="0"/>
+          <a:chExt cx="0" cy="0"/>
+        </a:xfrm>
+      </p:grpSpPr>
+      <p:sp>
+        <p:nvSpPr>
+          <p:cNvPr id="405" name="Google Shape;405;g335bf0e1a43_0_13:notes"/>
+          <p:cNvSpPr/>
+          <p:nvPr>
+            <p:ph idx="2" type="sldImg"/>
+          </p:nvPr>
+        </p:nvSpPr>
+        <p:spPr>
+          <a:xfrm>
+            <a:off x="381300" y="685800"/>
+            <a:ext cx="6096000" cy="3429000"/>
+          </a:xfrm>
+          <a:custGeom>
+            <a:rect b="b" l="l" r="r" t="t"/>
+            <a:pathLst>
+              <a:path extrusionOk="0" h="120000" w="120000">
+                <a:moveTo>
+                  <a:pt x="0" y="0"/>
+                </a:moveTo>
+                <a:lnTo>
+                  <a:pt x="120000" y="0"/>
+                </a:lnTo>
+                <a:lnTo>
+                  <a:pt x="120000" y="120000"/>
+                </a:lnTo>
+                <a:lnTo>
+                  <a:pt x="0" y="120000"/>
+                </a:lnTo>
+                <a:close/>
+              </a:path>
+            </a:pathLst>
+          </a:custGeom>
+        </p:spPr>
+      </p:sp>
+      <p:sp>
+        <p:nvSpPr>
+          <p:cNvPr id="406" name="Google Shape;406;g335bf0e1a43_0_13:notes"/>
           <p:cNvSpPr txBox="1"/>
           <p:nvPr>
             <p:ph idx="1" type="body"/>
@@ -1138,7 +1338,7 @@
       </p:grpSpPr>
       <p:sp>
         <p:nvSpPr>
-          <p:cNvPr id="356" name="Google Shape;356;g3407dad75c9_0_357:notes"/>
+          <p:cNvPr id="356" name="Google Shape;356;g335bf4e11cf_0_3:notes"/>
           <p:cNvSpPr/>
           <p:nvPr>
             <p:ph idx="2" type="sldImg"/>
@@ -1173,7 +1373,7 @@
       </p:sp>
       <p:sp>
         <p:nvSpPr>
-          <p:cNvPr id="357" name="Google Shape;357;g3407dad75c9_0_357:notes"/>
+          <p:cNvPr id="357" name="Google Shape;357;g335bf4e11cf_0_3:notes"/>
           <p:cNvSpPr txBox="1"/>
           <p:nvPr>
             <p:ph idx="1" type="body"/>
@@ -1237,7 +1437,7 @@
       </p:grpSpPr>
       <p:sp>
         <p:nvSpPr>
-          <p:cNvPr id="362" name="Google Shape;362;g3407dad75c9_0_362:notes"/>
+          <p:cNvPr id="362" name="Google Shape;362;g3407dad75c9_0_357:notes"/>
           <p:cNvSpPr/>
           <p:nvPr>
             <p:ph idx="2" type="sldImg"/>
@@ -1272,7 +1472,7 @@
       </p:sp>
       <p:sp>
         <p:nvSpPr>
-          <p:cNvPr id="363" name="Google Shape;363;g3407dad75c9_0_362:notes"/>
+          <p:cNvPr id="363" name="Google Shape;363;g3407dad75c9_0_357:notes"/>
           <p:cNvSpPr txBox="1"/>
           <p:nvPr>
             <p:ph idx="1" type="body"/>
@@ -1336,7 +1536,7 @@
       </p:grpSpPr>
       <p:sp>
         <p:nvSpPr>
-          <p:cNvPr id="368" name="Google Shape;368;g3407dad75c9_0_367:notes"/>
+          <p:cNvPr id="368" name="Google Shape;368;g3407dad75c9_0_362:notes"/>
           <p:cNvSpPr/>
           <p:nvPr>
             <p:ph idx="2" type="sldImg"/>
@@ -1371,7 +1571,7 @@
       </p:sp>
       <p:sp>
         <p:nvSpPr>
-          <p:cNvPr id="369" name="Google Shape;369;g3407dad75c9_0_367:notes"/>
+          <p:cNvPr id="369" name="Google Shape;369;g3407dad75c9_0_362:notes"/>
           <p:cNvSpPr txBox="1"/>
           <p:nvPr>
             <p:ph idx="1" type="body"/>
@@ -1435,7 +1635,7 @@
       </p:grpSpPr>
       <p:sp>
         <p:nvSpPr>
-          <p:cNvPr id="374" name="Google Shape;374;g3407dad75c9_0_376:notes"/>
+          <p:cNvPr id="374" name="Google Shape;374;g3407dad75c9_0_367:notes"/>
           <p:cNvSpPr/>
           <p:nvPr>
             <p:ph idx="2" type="sldImg"/>
@@ -1470,7 +1670,7 @@
       </p:sp>
       <p:sp>
         <p:nvSpPr>
-          <p:cNvPr id="375" name="Google Shape;375;g3407dad75c9_0_376:notes"/>
+          <p:cNvPr id="375" name="Google Shape;375;g3407dad75c9_0_367:notes"/>
           <p:cNvSpPr txBox="1"/>
           <p:nvPr>
             <p:ph idx="1" type="body"/>
@@ -1534,7 +1734,7 @@
       </p:grpSpPr>
       <p:sp>
         <p:nvSpPr>
-          <p:cNvPr id="380" name="Google Shape;380;g335bf0e1a43_0_1:notes"/>
+          <p:cNvPr id="380" name="Google Shape;380;g335bf4e11cf_0_14:notes"/>
           <p:cNvSpPr/>
           <p:nvPr>
             <p:ph idx="2" type="sldImg"/>
@@ -1569,7 +1769,7 @@
       </p:sp>
       <p:sp>
         <p:nvSpPr>
-          <p:cNvPr id="381" name="Google Shape;381;g335bf0e1a43_0_1:notes"/>
+          <p:cNvPr id="381" name="Google Shape;381;g335bf4e11cf_0_14:notes"/>
           <p:cNvSpPr txBox="1"/>
           <p:nvPr>
             <p:ph idx="1" type="body"/>
@@ -1633,7 +1833,7 @@
       </p:grpSpPr>
       <p:sp>
         <p:nvSpPr>
-          <p:cNvPr id="386" name="Google Shape;386;g335bf0e1a43_0_7:notes"/>
+          <p:cNvPr id="386" name="Google Shape;386;g3407dad75c9_0_376:notes"/>
           <p:cNvSpPr/>
           <p:nvPr>
             <p:ph idx="2" type="sldImg"/>
@@ -1668,7 +1868,7 @@
       </p:sp>
       <p:sp>
         <p:nvSpPr>
-          <p:cNvPr id="387" name="Google Shape;387;g335bf0e1a43_0_7:notes"/>
+          <p:cNvPr id="387" name="Google Shape;387;g3407dad75c9_0_376:notes"/>
           <p:cNvSpPr txBox="1"/>
           <p:nvPr>
             <p:ph idx="1" type="body"/>
@@ -33345,7 +33545,7 @@
   <p:cSld>
     <p:spTree>
       <p:nvGrpSpPr>
-        <p:cNvPr id="395" name="Shape 395"/>
+        <p:cNvPr id="394" name="Shape 394"/>
         <p:cNvGrpSpPr/>
         <p:nvPr/>
       </p:nvGrpSpPr>
@@ -33359,7 +33559,285 @@
       </p:grpSpPr>
       <p:sp>
         <p:nvSpPr>
+          <p:cNvPr id="395" name="Google Shape;395;p50"/>
+          <p:cNvSpPr txBox="1"/>
+          <p:nvPr>
+            <p:ph type="title"/>
+          </p:nvPr>
+        </p:nvSpPr>
+        <p:spPr>
+          <a:xfrm>
+            <a:off x="472350" y="336625"/>
+            <a:ext cx="6231300" cy="1688700"/>
+          </a:xfrm>
+          <a:prstGeom prst="rect">
+            <a:avLst/>
+          </a:prstGeom>
+        </p:spPr>
+        <p:txBody>
+          <a:bodyPr anchorCtr="0" anchor="t" bIns="91425" lIns="91425" spcFirstLastPara="1" rIns="91425" wrap="square" tIns="91425">
+            <a:noAutofit/>
+          </a:bodyPr>
+          <a:lstStyle/>
+          <a:p>
+            <a:pPr indent="0" lvl="0" marL="0" rtl="0" algn="l">
+              <a:spcBef>
+                <a:spcPts val="0"/>
+              </a:spcBef>
+              <a:spcAft>
+                <a:spcPts val="0"/>
+              </a:spcAft>
+              <a:buNone/>
+            </a:pPr>
+            <a:r>
+              <a:rPr lang="en"/>
+              <a:t>Improvements</a:t>
+            </a:r>
+            <a:endParaRPr/>
+          </a:p>
+        </p:txBody>
+      </p:sp>
+      <p:sp>
+        <p:nvSpPr>
           <p:cNvPr id="396" name="Google Shape;396;p50"/>
+          <p:cNvSpPr txBox="1"/>
+          <p:nvPr>
+            <p:ph idx="2" type="title"/>
+          </p:nvPr>
+        </p:nvSpPr>
+        <p:spPr>
+          <a:xfrm>
+            <a:off x="472350" y="1521225"/>
+            <a:ext cx="7665900" cy="3271200"/>
+          </a:xfrm>
+          <a:prstGeom prst="rect">
+            <a:avLst/>
+          </a:prstGeom>
+        </p:spPr>
+        <p:txBody>
+          <a:bodyPr anchorCtr="0" anchor="t" bIns="91425" lIns="91425" spcFirstLastPara="1" rIns="91425" wrap="square" tIns="91425">
+            <a:noAutofit/>
+          </a:bodyPr>
+          <a:lstStyle/>
+          <a:p>
+            <a:pPr indent="-342900" lvl="0" marL="457200" rtl="0" algn="l">
+              <a:spcBef>
+                <a:spcPts val="0"/>
+              </a:spcBef>
+              <a:spcAft>
+                <a:spcPts val="0"/>
+              </a:spcAft>
+              <a:buSzPts val="1800"/>
+              <a:buChar char="●"/>
+            </a:pPr>
+            <a:r>
+              <a:rPr lang="en"/>
+              <a:t>MAX31865 and PT100 RTD sensors. More expensive, but more accurate and work at temperatures as cold as -200°C. Uses SPI protocol, better than using analog pins.</a:t>
+            </a:r>
+            <a:endParaRPr/>
+          </a:p>
+          <a:p>
+            <a:pPr indent="-342900" lvl="0" marL="457200" rtl="0" algn="l">
+              <a:spcBef>
+                <a:spcPts val="0"/>
+              </a:spcBef>
+              <a:spcAft>
+                <a:spcPts val="0"/>
+              </a:spcAft>
+              <a:buSzPts val="1800"/>
+              <a:buChar char="●"/>
+            </a:pPr>
+            <a:r>
+              <a:rPr lang="en"/>
+              <a:t>Adafruit MPRLS sensor for pressure, expensive but well worth it, highly reliable, good accuracy, and works well in extreme environments</a:t>
+            </a:r>
+            <a:endParaRPr/>
+          </a:p>
+          <a:p>
+            <a:pPr indent="-342900" lvl="0" marL="457200" rtl="0" algn="l">
+              <a:spcBef>
+                <a:spcPts val="0"/>
+              </a:spcBef>
+              <a:spcAft>
+                <a:spcPts val="0"/>
+              </a:spcAft>
+              <a:buSzPts val="1800"/>
+              <a:buChar char="●"/>
+            </a:pPr>
+            <a:r>
+              <a:rPr lang="en"/>
+              <a:t>Most sensors using I2C protocol, which is better in high radiation environments</a:t>
+            </a:r>
+            <a:endParaRPr/>
+          </a:p>
+          <a:p>
+            <a:pPr indent="-342900" lvl="0" marL="457200" rtl="0" algn="l">
+              <a:spcBef>
+                <a:spcPts val="0"/>
+              </a:spcBef>
+              <a:spcAft>
+                <a:spcPts val="0"/>
+              </a:spcAft>
+              <a:buSzPts val="1800"/>
+              <a:buChar char="●"/>
+            </a:pPr>
+            <a:r>
+              <a:rPr lang="en"/>
+              <a:t>Significantly less power draw, as accelerometer and internal temp sensors draw very little current</a:t>
+            </a:r>
+            <a:endParaRPr/>
+          </a:p>
+        </p:txBody>
+      </p:sp>
+    </p:spTree>
+  </p:cSld>
+  <p:clrMapOvr>
+    <a:masterClrMapping/>
+  </p:clrMapOvr>
+</p:sld>
+</file>
+
+<file path=ppt/slides/slide11.xml><?xml version="1.0" encoding="utf-8"?>
+<p:sld xmlns:a="http://schemas.openxmlformats.org/drawingml/2006/main" xmlns:r="http://schemas.openxmlformats.org/officeDocument/2006/relationships" xmlns:mc="http://schemas.openxmlformats.org/markup-compatibility/2006" xmlns:mv="urn:schemas-microsoft-com:mac:vml" xmlns:p="http://schemas.openxmlformats.org/presentationml/2006/main" xmlns:c="http://schemas.openxmlformats.org/drawingml/2006/chart" xmlns:dgm="http://schemas.openxmlformats.org/drawingml/2006/diagram" xmlns:o="urn:schemas-microsoft-com:office:office" xmlns:v="urn:schemas-microsoft-com:vml" xmlns:pvml="urn:schemas-microsoft-com:office:powerpoint" xmlns:com="http://schemas.openxmlformats.org/drawingml/2006/compatibility" xmlns:p14="http://schemas.microsoft.com/office/powerpoint/2010/main" xmlns:p15="http://schemas.microsoft.com/office/powerpoint/2012/main" xmlns:ahyp="http://schemas.microsoft.com/office/drawing/2018/hyperlinkcolor">
+  <p:cSld>
+    <p:spTree>
+      <p:nvGrpSpPr>
+        <p:cNvPr id="400" name="Shape 400"/>
+        <p:cNvGrpSpPr/>
+        <p:nvPr/>
+      </p:nvGrpSpPr>
+      <p:grpSpPr>
+        <a:xfrm>
+          <a:off x="0" y="0"/>
+          <a:ext cx="0" cy="0"/>
+          <a:chOff x="0" y="0"/>
+          <a:chExt cx="0" cy="0"/>
+        </a:xfrm>
+      </p:grpSpPr>
+      <p:sp>
+        <p:nvSpPr>
+          <p:cNvPr id="401" name="Google Shape;401;p51"/>
+          <p:cNvSpPr txBox="1"/>
+          <p:nvPr>
+            <p:ph type="title"/>
+          </p:nvPr>
+        </p:nvSpPr>
+        <p:spPr>
+          <a:xfrm>
+            <a:off x="472350" y="513275"/>
+            <a:ext cx="6231300" cy="1688700"/>
+          </a:xfrm>
+          <a:prstGeom prst="rect">
+            <a:avLst/>
+          </a:prstGeom>
+        </p:spPr>
+        <p:txBody>
+          <a:bodyPr anchorCtr="0" anchor="t" bIns="91425" lIns="91425" spcFirstLastPara="1" rIns="91425" wrap="square" tIns="91425">
+            <a:noAutofit/>
+          </a:bodyPr>
+          <a:lstStyle/>
+          <a:p>
+            <a:pPr indent="0" lvl="0" marL="0" rtl="0" algn="l">
+              <a:spcBef>
+                <a:spcPts val="0"/>
+              </a:spcBef>
+              <a:spcAft>
+                <a:spcPts val="0"/>
+              </a:spcAft>
+              <a:buNone/>
+            </a:pPr>
+            <a:r>
+              <a:rPr lang="en"/>
+              <a:t>PCB</a:t>
+            </a:r>
+            <a:endParaRPr/>
+          </a:p>
+        </p:txBody>
+      </p:sp>
+      <p:pic>
+        <p:nvPicPr>
+          <p:cNvPr id="402" name="Google Shape;402;p51"/>
+          <p:cNvPicPr preferRelativeResize="0"/>
+          <p:nvPr/>
+        </p:nvPicPr>
+        <p:blipFill>
+          <a:blip r:embed="rId3">
+            <a:alphaModFix/>
+          </a:blip>
+          <a:stretch>
+            <a:fillRect/>
+          </a:stretch>
+        </p:blipFill>
+        <p:spPr>
+          <a:xfrm>
+            <a:off x="472350" y="1460750"/>
+            <a:ext cx="3478226" cy="2221798"/>
+          </a:xfrm>
+          <a:prstGeom prst="rect">
+            <a:avLst/>
+          </a:prstGeom>
+          <a:noFill/>
+          <a:ln>
+            <a:noFill/>
+          </a:ln>
+        </p:spPr>
+      </p:pic>
+      <p:pic>
+        <p:nvPicPr>
+          <p:cNvPr id="403" name="Google Shape;403;p51"/>
+          <p:cNvPicPr preferRelativeResize="0"/>
+          <p:nvPr/>
+        </p:nvPicPr>
+        <p:blipFill>
+          <a:blip r:embed="rId4">
+            <a:alphaModFix/>
+          </a:blip>
+          <a:stretch>
+            <a:fillRect/>
+          </a:stretch>
+        </p:blipFill>
+        <p:spPr>
+          <a:xfrm>
+            <a:off x="4572000" y="1460750"/>
+            <a:ext cx="2703431" cy="2221799"/>
+          </a:xfrm>
+          <a:prstGeom prst="rect">
+            <a:avLst/>
+          </a:prstGeom>
+          <a:noFill/>
+          <a:ln>
+            <a:noFill/>
+          </a:ln>
+        </p:spPr>
+      </p:pic>
+    </p:spTree>
+  </p:cSld>
+  <p:clrMapOvr>
+    <a:masterClrMapping/>
+  </p:clrMapOvr>
+</p:sld>
+</file>
+
+<file path=ppt/slides/slide12.xml><?xml version="1.0" encoding="utf-8"?>
+<p:sld xmlns:a="http://schemas.openxmlformats.org/drawingml/2006/main" xmlns:r="http://schemas.openxmlformats.org/officeDocument/2006/relationships" xmlns:mc="http://schemas.openxmlformats.org/markup-compatibility/2006" xmlns:mv="urn:schemas-microsoft-com:mac:vml" xmlns:p="http://schemas.openxmlformats.org/presentationml/2006/main" xmlns:c="http://schemas.openxmlformats.org/drawingml/2006/chart" xmlns:dgm="http://schemas.openxmlformats.org/drawingml/2006/diagram" xmlns:o="urn:schemas-microsoft-com:office:office" xmlns:v="urn:schemas-microsoft-com:vml" xmlns:pvml="urn:schemas-microsoft-com:office:powerpoint" xmlns:com="http://schemas.openxmlformats.org/drawingml/2006/compatibility" xmlns:p14="http://schemas.microsoft.com/office/powerpoint/2010/main" xmlns:p15="http://schemas.microsoft.com/office/powerpoint/2012/main" xmlns:ahyp="http://schemas.microsoft.com/office/drawing/2018/hyperlinkcolor">
+  <p:cSld>
+    <p:spTree>
+      <p:nvGrpSpPr>
+        <p:cNvPr id="407" name="Shape 407"/>
+        <p:cNvGrpSpPr/>
+        <p:nvPr/>
+      </p:nvGrpSpPr>
+      <p:grpSpPr>
+        <a:xfrm>
+          <a:off x="0" y="0"/>
+          <a:ext cx="0" cy="0"/>
+          <a:chOff x="0" y="0"/>
+          <a:chExt cx="0" cy="0"/>
+        </a:xfrm>
+      </p:grpSpPr>
+      <p:sp>
+        <p:nvSpPr>
+          <p:cNvPr id="408" name="Google Shape;408;p52"/>
           <p:cNvSpPr txBox="1"/>
           <p:nvPr>
             <p:ph type="title"/>
@@ -33399,7 +33877,7 @@
       </p:sp>
       <p:pic>
         <p:nvPicPr>
-          <p:cNvPr id="397" name="Google Shape;397;p50"/>
+          <p:cNvPr id="409" name="Google Shape;409;p52"/>
           <p:cNvPicPr preferRelativeResize="0"/>
           <p:nvPr/>
         </p:nvPicPr>
@@ -33846,8 +34324,8 @@
         </p:nvSpPr>
         <p:spPr>
           <a:xfrm>
-            <a:off x="560525" y="387025"/>
-            <a:ext cx="8278800" cy="1341000"/>
+            <a:off x="430400" y="618900"/>
+            <a:ext cx="6231300" cy="1688700"/>
           </a:xfrm>
           <a:prstGeom prst="rect">
             <a:avLst/>
@@ -33870,94 +34348,40 @@
             </a:pPr>
             <a:r>
               <a:rPr lang="en"/>
-              <a:t>Current Design- Flaws</a:t>
+              <a:t>Current Block Diagram</a:t>
             </a:r>
             <a:endParaRPr/>
           </a:p>
         </p:txBody>
       </p:sp>
-      <p:sp>
-        <p:nvSpPr>
+      <p:pic>
+        <p:nvPicPr>
           <p:cNvPr id="360" name="Google Shape;360;p44"/>
-          <p:cNvSpPr txBox="1"/>
-          <p:nvPr>
-            <p:ph idx="2" type="title"/>
-          </p:nvPr>
-        </p:nvSpPr>
+          <p:cNvPicPr preferRelativeResize="0"/>
+          <p:nvPr/>
+        </p:nvPicPr>
+        <p:blipFill>
+          <a:blip r:embed="rId3">
+            <a:alphaModFix/>
+          </a:blip>
+          <a:stretch>
+            <a:fillRect/>
+          </a:stretch>
+        </p:blipFill>
         <p:spPr>
           <a:xfrm>
-            <a:off x="560525" y="2130175"/>
-            <a:ext cx="8179500" cy="2360400"/>
+            <a:off x="2419350" y="2307600"/>
+            <a:ext cx="3063857" cy="2531100"/>
           </a:xfrm>
           <a:prstGeom prst="rect">
             <a:avLst/>
           </a:prstGeom>
+          <a:noFill/>
+          <a:ln>
+            <a:noFill/>
+          </a:ln>
         </p:spPr>
-        <p:txBody>
-          <a:bodyPr anchorCtr="0" anchor="t" bIns="91425" lIns="91425" spcFirstLastPara="1" rIns="91425" wrap="square" tIns="91425">
-            <a:noAutofit/>
-          </a:bodyPr>
-          <a:lstStyle/>
-          <a:p>
-            <a:pPr indent="0" lvl="0" marL="0" rtl="0" algn="l">
-              <a:spcBef>
-                <a:spcPts val="0"/>
-              </a:spcBef>
-              <a:spcAft>
-                <a:spcPts val="0"/>
-              </a:spcAft>
-              <a:buNone/>
-            </a:pPr>
-            <a:r>
-              <a:rPr lang="en"/>
-              <a:t>The current design of the PCB shield has several drawbacks that may encumber a student’s ability to launch the payload:</a:t>
-            </a:r>
-            <a:endParaRPr/>
-          </a:p>
-          <a:p>
-            <a:pPr indent="-342900" lvl="0" marL="457200" rtl="0" algn="l">
-              <a:spcBef>
-                <a:spcPts val="0"/>
-              </a:spcBef>
-              <a:spcAft>
-                <a:spcPts val="0"/>
-              </a:spcAft>
-              <a:buSzPts val="1800"/>
-              <a:buChar char="●"/>
-            </a:pPr>
-            <a:r>
-              <a:rPr lang="en"/>
-              <a:t>Several components are unavailable, </a:t>
-            </a:r>
-            <a:r>
-              <a:rPr lang="en"/>
-              <a:t>including</a:t>
-            </a:r>
-            <a:r>
-              <a:rPr lang="en"/>
-              <a:t> the humidity sensor.</a:t>
-            </a:r>
-            <a:endParaRPr/>
-          </a:p>
-          <a:p>
-            <a:pPr indent="-342900" lvl="0" marL="457200" rtl="0" algn="l">
-              <a:spcBef>
-                <a:spcPts val="0"/>
-              </a:spcBef>
-              <a:spcAft>
-                <a:spcPts val="0"/>
-              </a:spcAft>
-              <a:buSzPts val="1800"/>
-              <a:buChar char="●"/>
-            </a:pPr>
-            <a:r>
-              <a:rPr lang="en"/>
-              <a:t>The shield relies heavily on components that use analog pins to communicate with the microprocessor</a:t>
-            </a:r>
-            <a:endParaRPr/>
-          </a:p>
-        </p:txBody>
-      </p:sp>
+      </p:pic>
     </p:spTree>
   </p:cSld>
   <p:clrMapOvr>
@@ -33993,8 +34417,8 @@
         </p:nvSpPr>
         <p:spPr>
           <a:xfrm>
-            <a:off x="472350" y="497550"/>
-            <a:ext cx="8106900" cy="1712400"/>
+            <a:off x="560525" y="387025"/>
+            <a:ext cx="8278800" cy="1341000"/>
           </a:xfrm>
           <a:prstGeom prst="rect">
             <a:avLst/>
@@ -34017,7 +34441,7 @@
             </a:pPr>
             <a:r>
               <a:rPr lang="en"/>
-              <a:t>Aside on analog pins</a:t>
+              <a:t>Current Design- Flaws</a:t>
             </a:r>
             <a:endParaRPr/>
           </a:p>
@@ -34033,8 +34457,8 @@
         </p:nvSpPr>
         <p:spPr>
           <a:xfrm>
-            <a:off x="472350" y="1889050"/>
-            <a:ext cx="8388000" cy="2641800"/>
+            <a:off x="560525" y="2130175"/>
+            <a:ext cx="8179500" cy="2360400"/>
           </a:xfrm>
           <a:prstGeom prst="rect">
             <a:avLst/>
@@ -34046,6 +34470,22 @@
           </a:bodyPr>
           <a:lstStyle/>
           <a:p>
+            <a:pPr indent="0" lvl="0" marL="0" rtl="0" algn="l">
+              <a:spcBef>
+                <a:spcPts val="0"/>
+              </a:spcBef>
+              <a:spcAft>
+                <a:spcPts val="0"/>
+              </a:spcAft>
+              <a:buNone/>
+            </a:pPr>
+            <a:r>
+              <a:rPr lang="en"/>
+              <a:t>The current design of the PCB shield has several drawbacks that may encumber a student’s ability to launch the payload:</a:t>
+            </a:r>
+            <a:endParaRPr/>
+          </a:p>
+          <a:p>
             <a:pPr indent="-342900" lvl="0" marL="457200" rtl="0" algn="l">
               <a:spcBef>
                 <a:spcPts val="0"/>
@@ -34058,7 +34498,15 @@
             </a:pPr>
             <a:r>
               <a:rPr lang="en"/>
-              <a:t>Distance - with so many components relying on the Arduino analog pins, it is likely that a few of them will be placed far from the arduino analog pins</a:t>
+              <a:t>Several components are unavailable, </a:t>
+            </a:r>
+            <a:r>
+              <a:rPr lang="en"/>
+              <a:t>including</a:t>
+            </a:r>
+            <a:r>
+              <a:rPr lang="en"/>
+              <a:t> the humidity sensor.</a:t>
             </a:r>
             <a:endParaRPr/>
           </a:p>
@@ -34075,24 +34523,7 @@
             </a:pPr>
             <a:r>
               <a:rPr lang="en"/>
-              <a:t>Error susceptibility - Analog pins read voltage levels, which are highly susceptible to environmental noise. In high altitude, electrical interference is more likely due to the presence of high energy radiation</a:t>
-            </a:r>
-            <a:endParaRPr/>
-          </a:p>
-          <a:p>
-            <a:pPr indent="-342900" lvl="0" marL="457200" rtl="0" algn="l">
-              <a:spcBef>
-                <a:spcPts val="0"/>
-              </a:spcBef>
-              <a:spcAft>
-                <a:spcPts val="0"/>
-              </a:spcAft>
-              <a:buSzPts val="1800"/>
-              <a:buChar char="●"/>
-            </a:pPr>
-            <a:r>
-              <a:rPr lang="en"/>
-              <a:t>Convenience - You need an ADC</a:t>
+              <a:t>The shield relies heavily on components that use analog pins to communicate with the microprocessor</a:t>
             </a:r>
             <a:endParaRPr/>
           </a:p>
@@ -34133,8 +34564,8 @@
         </p:nvSpPr>
         <p:spPr>
           <a:xfrm>
-            <a:off x="378175" y="410550"/>
-            <a:ext cx="7998600" cy="1339500"/>
+            <a:off x="472350" y="497550"/>
+            <a:ext cx="8106900" cy="1712400"/>
           </a:xfrm>
           <a:prstGeom prst="rect">
             <a:avLst/>
@@ -34157,7 +34588,7 @@
             </a:pPr>
             <a:r>
               <a:rPr lang="en"/>
-              <a:t>Considerations</a:t>
+              <a:t>Aside on analog pins</a:t>
             </a:r>
             <a:endParaRPr/>
           </a:p>
@@ -34173,8 +34604,8 @@
         </p:nvSpPr>
         <p:spPr>
           <a:xfrm>
-            <a:off x="378175" y="1586825"/>
-            <a:ext cx="8297400" cy="2905800"/>
+            <a:off x="472350" y="1889050"/>
+            <a:ext cx="8388000" cy="2641800"/>
           </a:xfrm>
           <a:prstGeom prst="rect">
             <a:avLst/>
@@ -34198,7 +34629,7 @@
             </a:pPr>
             <a:r>
               <a:rPr lang="en"/>
-              <a:t>Want to use I2C or SPI for reasons outlined in preceding slide</a:t>
+              <a:t>Distance - with so many components relying on the Arduino analog pins, it is likely that a few of them will be placed far from the arduino analog pins</a:t>
             </a:r>
             <a:endParaRPr/>
           </a:p>
@@ -34215,7 +34646,7 @@
             </a:pPr>
             <a:r>
               <a:rPr lang="en"/>
-              <a:t>For multiple devices, it is convenient to use I2C - due to its shared bus architecture with unique addresses (so long as we don’t use too many of the exact same IC)</a:t>
+              <a:t>Error susceptibility - Analog pins read voltage levels, which are highly susceptible to environmental noise. In high altitude, electrical interference is more likely due to the presence of high energy radiation</a:t>
             </a:r>
             <a:endParaRPr/>
           </a:p>
@@ -34232,28 +34663,7 @@
             </a:pPr>
             <a:r>
               <a:rPr lang="en"/>
-              <a:t>Our humidity sensor needs to operate in extreme conditions, we are looking for a humidity sensor that is able to take measurements in all RH ranges.</a:t>
-            </a:r>
-            <a:endParaRPr/>
-          </a:p>
-          <a:p>
-            <a:pPr indent="-342900" lvl="0" marL="457200" rtl="0" algn="l">
-              <a:spcBef>
-                <a:spcPts val="0"/>
-              </a:spcBef>
-              <a:spcAft>
-                <a:spcPts val="0"/>
-              </a:spcAft>
-              <a:buSzPts val="1800"/>
-              <a:buChar char="●"/>
-            </a:pPr>
-            <a:r>
-              <a:rPr lang="en"/>
-              <a:t>Our external temperature </a:t>
-            </a:r>
-            <a:r>
-              <a:rPr lang="en"/>
-              <a:t>sensor must withstand &lt; -50 °C temperatures (this is not very common)</a:t>
+              <a:t>Convenience - You need an ADC</a:t>
             </a:r>
             <a:endParaRPr/>
           </a:p>
@@ -34294,8 +34704,8 @@
         </p:nvSpPr>
         <p:spPr>
           <a:xfrm>
-            <a:off x="472350" y="431875"/>
-            <a:ext cx="5354100" cy="987300"/>
+            <a:off x="378175" y="410550"/>
+            <a:ext cx="7998600" cy="1339500"/>
           </a:xfrm>
           <a:prstGeom prst="rect">
             <a:avLst/>
@@ -34318,40 +34728,108 @@
             </a:pPr>
             <a:r>
               <a:rPr lang="en"/>
-              <a:t>Components</a:t>
+              <a:t>Considerations</a:t>
             </a:r>
             <a:endParaRPr/>
           </a:p>
         </p:txBody>
       </p:sp>
-      <p:pic>
-        <p:nvPicPr>
+      <p:sp>
+        <p:nvSpPr>
           <p:cNvPr id="378" name="Google Shape;378;p47"/>
-          <p:cNvPicPr preferRelativeResize="0"/>
-          <p:nvPr/>
-        </p:nvPicPr>
-        <p:blipFill>
-          <a:blip r:embed="rId3">
-            <a:alphaModFix/>
-          </a:blip>
-          <a:stretch>
-            <a:fillRect/>
-          </a:stretch>
-        </p:blipFill>
+          <p:cNvSpPr txBox="1"/>
+          <p:nvPr>
+            <p:ph idx="2" type="title"/>
+          </p:nvPr>
+        </p:nvSpPr>
         <p:spPr>
           <a:xfrm>
-            <a:off x="966375" y="1419175"/>
-            <a:ext cx="6059949" cy="3277499"/>
+            <a:off x="378175" y="1586825"/>
+            <a:ext cx="8297400" cy="2905800"/>
           </a:xfrm>
           <a:prstGeom prst="rect">
             <a:avLst/>
           </a:prstGeom>
-          <a:noFill/>
-          <a:ln>
-            <a:noFill/>
-          </a:ln>
         </p:spPr>
-      </p:pic>
+        <p:txBody>
+          <a:bodyPr anchorCtr="0" anchor="t" bIns="91425" lIns="91425" spcFirstLastPara="1" rIns="91425" wrap="square" tIns="91425">
+            <a:noAutofit/>
+          </a:bodyPr>
+          <a:lstStyle/>
+          <a:p>
+            <a:pPr indent="-342900" lvl="0" marL="457200" rtl="0" algn="l">
+              <a:spcBef>
+                <a:spcPts val="0"/>
+              </a:spcBef>
+              <a:spcAft>
+                <a:spcPts val="0"/>
+              </a:spcAft>
+              <a:buSzPts val="1800"/>
+              <a:buChar char="●"/>
+            </a:pPr>
+            <a:r>
+              <a:rPr lang="en"/>
+              <a:t>Want to use I2C or SPI for reasons outlined in preceding slide</a:t>
+            </a:r>
+            <a:endParaRPr/>
+          </a:p>
+          <a:p>
+            <a:pPr indent="-342900" lvl="0" marL="457200" rtl="0" algn="l">
+              <a:spcBef>
+                <a:spcPts val="0"/>
+              </a:spcBef>
+              <a:spcAft>
+                <a:spcPts val="0"/>
+              </a:spcAft>
+              <a:buSzPts val="1800"/>
+              <a:buChar char="●"/>
+            </a:pPr>
+            <a:r>
+              <a:rPr lang="en"/>
+              <a:t>For multiple devices, it is convenient to use I2C - due to its shared bus architecture with unique addresses (so long as we don’t use too many of the exact same IC)</a:t>
+            </a:r>
+            <a:endParaRPr/>
+          </a:p>
+          <a:p>
+            <a:pPr indent="-342900" lvl="0" marL="457200" rtl="0" algn="l">
+              <a:spcBef>
+                <a:spcPts val="0"/>
+              </a:spcBef>
+              <a:spcAft>
+                <a:spcPts val="0"/>
+              </a:spcAft>
+              <a:buSzPts val="1800"/>
+              <a:buChar char="●"/>
+            </a:pPr>
+            <a:r>
+              <a:rPr lang="en"/>
+              <a:t>Our humidity sensor needs to operate in extreme conditions, we are looking for a humidity sensor that is able to take measurements in all RH ranges.</a:t>
+            </a:r>
+            <a:endParaRPr/>
+          </a:p>
+          <a:p>
+            <a:pPr indent="-342900" lvl="0" marL="457200" rtl="0" algn="l">
+              <a:spcBef>
+                <a:spcPts val="0"/>
+              </a:spcBef>
+              <a:spcAft>
+                <a:spcPts val="0"/>
+              </a:spcAft>
+              <a:buSzPts val="1800"/>
+              <a:buChar char="●"/>
+            </a:pPr>
+            <a:r>
+              <a:rPr lang="en"/>
+              <a:t>Our external temperature </a:t>
+            </a:r>
+            <a:r>
+              <a:rPr lang="en"/>
+              <a:t>sensor must withstand &lt; -50 °C temperatures (this is not very common)</a:t>
+            </a:r>
+            <a:endParaRPr/>
+          </a:p>
+        </p:txBody>
+      </p:sp>
     </p:spTree>
   </p:cSld>
   <p:clrMapOvr>
@@ -34387,7 +34865,7 @@
         </p:nvSpPr>
         <p:spPr>
           <a:xfrm>
-            <a:off x="472350" y="336625"/>
+            <a:off x="411350" y="723675"/>
             <a:ext cx="6231300" cy="1688700"/>
           </a:xfrm>
           <a:prstGeom prst="rect">
@@ -34411,104 +34889,40 @@
             </a:pPr>
             <a:r>
               <a:rPr lang="en"/>
-              <a:t>Improvements</a:t>
+              <a:t>New Block Diagram</a:t>
             </a:r>
             <a:endParaRPr/>
           </a:p>
         </p:txBody>
       </p:sp>
-      <p:sp>
-        <p:nvSpPr>
+      <p:pic>
+        <p:nvPicPr>
           <p:cNvPr id="384" name="Google Shape;384;p48"/>
-          <p:cNvSpPr txBox="1"/>
-          <p:nvPr>
-            <p:ph idx="2" type="title"/>
-          </p:nvPr>
-        </p:nvSpPr>
+          <p:cNvPicPr preferRelativeResize="0"/>
+          <p:nvPr/>
+        </p:nvPicPr>
+        <p:blipFill>
+          <a:blip r:embed="rId3">
+            <a:alphaModFix/>
+          </a:blip>
+          <a:stretch>
+            <a:fillRect/>
+          </a:stretch>
+        </p:blipFill>
         <p:spPr>
           <a:xfrm>
-            <a:off x="472350" y="1521225"/>
-            <a:ext cx="7665900" cy="3271200"/>
+            <a:off x="2590800" y="2526675"/>
+            <a:ext cx="2788225" cy="2426326"/>
           </a:xfrm>
           <a:prstGeom prst="rect">
             <a:avLst/>
           </a:prstGeom>
+          <a:noFill/>
+          <a:ln>
+            <a:noFill/>
+          </a:ln>
         </p:spPr>
-        <p:txBody>
-          <a:bodyPr anchorCtr="0" anchor="t" bIns="91425" lIns="91425" spcFirstLastPara="1" rIns="91425" wrap="square" tIns="91425">
-            <a:noAutofit/>
-          </a:bodyPr>
-          <a:lstStyle/>
-          <a:p>
-            <a:pPr indent="-342900" lvl="0" marL="457200" rtl="0" algn="l">
-              <a:spcBef>
-                <a:spcPts val="0"/>
-              </a:spcBef>
-              <a:spcAft>
-                <a:spcPts val="0"/>
-              </a:spcAft>
-              <a:buSzPts val="1800"/>
-              <a:buChar char="●"/>
-            </a:pPr>
-            <a:r>
-              <a:rPr lang="en"/>
-              <a:t>MAX31865 and PT100 RTD sensors. More expensive, but more accurate and work at temperatures as cold as -200°C. Uses SPI protocol, better than using analog pins.</a:t>
-            </a:r>
-            <a:endParaRPr/>
-          </a:p>
-          <a:p>
-            <a:pPr indent="-342900" lvl="0" marL="457200" rtl="0" algn="l">
-              <a:spcBef>
-                <a:spcPts val="0"/>
-              </a:spcBef>
-              <a:spcAft>
-                <a:spcPts val="0"/>
-              </a:spcAft>
-              <a:buSzPts val="1800"/>
-              <a:buChar char="●"/>
-            </a:pPr>
-            <a:r>
-              <a:rPr lang="en"/>
-              <a:t>Adafruit MPRLS sensor for pressure, expensive but well worth it, highly reliable, good accuracy, and works well in extreme environments</a:t>
-            </a:r>
-            <a:endParaRPr/>
-          </a:p>
-          <a:p>
-            <a:pPr indent="-342900" lvl="0" marL="457200" rtl="0" algn="l">
-              <a:spcBef>
-                <a:spcPts val="0"/>
-              </a:spcBef>
-              <a:spcAft>
-                <a:spcPts val="0"/>
-              </a:spcAft>
-              <a:buSzPts val="1800"/>
-              <a:buChar char="●"/>
-            </a:pPr>
-            <a:r>
-              <a:rPr lang="en"/>
-              <a:t>Most sensors using I2C protocol, which is better in high radiation environments</a:t>
-            </a:r>
-            <a:endParaRPr/>
-          </a:p>
-          <a:p>
-            <a:pPr indent="-342900" lvl="0" marL="457200" rtl="0" algn="l">
-              <a:spcBef>
-                <a:spcPts val="0"/>
-              </a:spcBef>
-              <a:spcAft>
-                <a:spcPts val="0"/>
-              </a:spcAft>
-              <a:buSzPts val="1800"/>
-              <a:buChar char="●"/>
-            </a:pPr>
-            <a:r>
-              <a:rPr lang="en"/>
-              <a:t>Significantly less power draw, as accelerometer and internal temp sensors draw very little current</a:t>
-            </a:r>
-            <a:endParaRPr/>
-          </a:p>
-        </p:txBody>
-      </p:sp>
+      </p:pic>
     </p:spTree>
   </p:cSld>
   <p:clrMapOvr>
@@ -34544,8 +34958,8 @@
         </p:nvSpPr>
         <p:spPr>
           <a:xfrm>
-            <a:off x="472350" y="513275"/>
-            <a:ext cx="6231300" cy="1688700"/>
+            <a:off x="472350" y="431875"/>
+            <a:ext cx="5354100" cy="987300"/>
           </a:xfrm>
           <a:prstGeom prst="rect">
             <a:avLst/>
@@ -34568,7 +34982,7 @@
             </a:pPr>
             <a:r>
               <a:rPr lang="en"/>
-              <a:t>PCB</a:t>
+              <a:t>Components</a:t>
             </a:r>
             <a:endParaRPr/>
           </a:p>
@@ -34590,36 +35004,8 @@
         </p:blipFill>
         <p:spPr>
           <a:xfrm>
-            <a:off x="472350" y="1460750"/>
-            <a:ext cx="3478226" cy="2221798"/>
-          </a:xfrm>
-          <a:prstGeom prst="rect">
-            <a:avLst/>
-          </a:prstGeom>
-          <a:noFill/>
-          <a:ln>
-            <a:noFill/>
-          </a:ln>
-        </p:spPr>
-      </p:pic>
-      <p:pic>
-        <p:nvPicPr>
-          <p:cNvPr id="391" name="Google Shape;391;p49"/>
-          <p:cNvPicPr preferRelativeResize="0"/>
-          <p:nvPr/>
-        </p:nvPicPr>
-        <p:blipFill>
-          <a:blip r:embed="rId4">
-            <a:alphaModFix/>
-          </a:blip>
-          <a:stretch>
-            <a:fillRect/>
-          </a:stretch>
-        </p:blipFill>
-        <p:spPr>
-          <a:xfrm>
-            <a:off x="4572000" y="1460750"/>
-            <a:ext cx="2703431" cy="2221799"/>
+            <a:off x="1319213" y="1263762"/>
+            <a:ext cx="6505575" cy="3511325"/>
           </a:xfrm>
           <a:prstGeom prst="rect">
             <a:avLst/>
@@ -34639,6 +35025,285 @@
 </file>
 
 <file path=ppt/theme/theme1.xml><?xml version="1.0" encoding="utf-8"?>
+<a:theme xmlns:a="http://schemas.openxmlformats.org/drawingml/2006/main" xmlns:r="http://schemas.openxmlformats.org/officeDocument/2006/relationships" name="Investor Pitch">
+  <a:themeElements>
+    <a:clrScheme name="Simple Light">
+      <a:dk1>
+        <a:srgbClr val="1A36B4"/>
+      </a:dk1>
+      <a:lt1>
+        <a:srgbClr val="F6F5EC"/>
+      </a:lt1>
+      <a:dk2>
+        <a:srgbClr val="1D1D1D"/>
+      </a:dk2>
+      <a:lt2>
+        <a:srgbClr val="A4C2F4"/>
+      </a:lt2>
+      <a:accent1>
+        <a:srgbClr val="FFFFFF"/>
+      </a:accent1>
+      <a:accent2>
+        <a:srgbClr val="1A36B4"/>
+      </a:accent2>
+      <a:accent3>
+        <a:srgbClr val="1D1D1D"/>
+      </a:accent3>
+      <a:accent4>
+        <a:srgbClr val="F6F5EC"/>
+      </a:accent4>
+      <a:accent5>
+        <a:srgbClr val="1A36B4"/>
+      </a:accent5>
+      <a:accent6>
+        <a:srgbClr val="595959"/>
+      </a:accent6>
+      <a:hlink>
+        <a:srgbClr val="A4C2F4"/>
+      </a:hlink>
+      <a:folHlink>
+        <a:srgbClr val="0097A7"/>
+      </a:folHlink>
+    </a:clrScheme>
+    <a:fontScheme name="Office">
+      <a:majorFont>
+        <a:latin typeface="Arial"/>
+        <a:ea typeface=""/>
+        <a:cs typeface=""/>
+        <a:font script="Jpan" typeface="ＭＳ Ｐゴシック"/>
+        <a:font script="Hang" typeface="맑은 고딕"/>
+        <a:font script="Hans" typeface="宋体"/>
+        <a:font script="Hant" typeface="新細明體"/>
+        <a:font script="Arab" typeface="Times New Roman"/>
+        <a:font script="Hebr" typeface="Times New Roman"/>
+        <a:font script="Thai" typeface="Angsana New"/>
+        <a:font script="Ethi" typeface="Nyala"/>
+        <a:font script="Beng" typeface="Vrinda"/>
+        <a:font script="Gujr" typeface="Shruti"/>
+        <a:font script="Khmr" typeface="MoolBoran"/>
+        <a:font script="Knda" typeface="Tunga"/>
+        <a:font script="Guru" typeface="Raavi"/>
+        <a:font script="Cans" typeface="Euphemia"/>
+        <a:font script="Cher" typeface="Plantagenet Cherokee"/>
+        <a:font script="Yiii" typeface="Microsoft Yi Baiti"/>
+        <a:font script="Tibt" typeface="Microsoft Himalaya"/>
+        <a:font script="Thaa" typeface="MV Boli"/>
+        <a:font script="Deva" typeface="Mangal"/>
+        <a:font script="Telu" typeface="Gautami"/>
+        <a:font script="Taml" typeface="Latha"/>
+        <a:font script="Syrc" typeface="Estrangelo Edessa"/>
+        <a:font script="Orya" typeface="Kalinga"/>
+        <a:font script="Mlym" typeface="Kartika"/>
+        <a:font script="Laoo" typeface="DokChampa"/>
+        <a:font script="Sinh" typeface="Iskoola Pota"/>
+        <a:font script="Mong" typeface="Mongolian Baiti"/>
+        <a:font script="Viet" typeface="Times New Roman"/>
+        <a:font script="Uigh" typeface="Microsoft Uighur"/>
+        <a:font script="Geor" typeface="Sylfaen"/>
+      </a:majorFont>
+      <a:minorFont>
+        <a:latin typeface="Arial"/>
+        <a:ea typeface=""/>
+        <a:cs typeface=""/>
+        <a:font script="Jpan" typeface="ＭＳ Ｐゴシック"/>
+        <a:font script="Hang" typeface="맑은 고딕"/>
+        <a:font script="Hans" typeface="宋体"/>
+        <a:font script="Hant" typeface="新細明體"/>
+        <a:font script="Arab" typeface="Arial"/>
+        <a:font script="Hebr" typeface="Arial"/>
+        <a:font script="Thai" typeface="Cordia New"/>
+        <a:font script="Ethi" typeface="Nyala"/>
+        <a:font script="Beng" typeface="Vrinda"/>
+        <a:font script="Gujr" typeface="Shruti"/>
+        <a:font script="Khmr" typeface="DaunPenh"/>
+        <a:font script="Knda" typeface="Tunga"/>
+        <a:font script="Guru" typeface="Raavi"/>
+        <a:font script="Cans" typeface="Euphemia"/>
+        <a:font script="Cher" typeface="Plantagenet Cherokee"/>
+        <a:font script="Yiii" typeface="Microsoft Yi Baiti"/>
+        <a:font script="Tibt" typeface="Microsoft Himalaya"/>
+        <a:font script="Thaa" typeface="MV Boli"/>
+        <a:font script="Deva" typeface="Mangal"/>
+        <a:font script="Telu" typeface="Gautami"/>
+        <a:font script="Taml" typeface="Latha"/>
+        <a:font script="Syrc" typeface="Estrangelo Edessa"/>
+        <a:font script="Orya" typeface="Kalinga"/>
+        <a:font script="Mlym" typeface="Kartika"/>
+        <a:font script="Laoo" typeface="DokChampa"/>
+        <a:font script="Sinh" typeface="Iskoola Pota"/>
+        <a:font script="Mong" typeface="Mongolian Baiti"/>
+        <a:font script="Viet" typeface="Arial"/>
+        <a:font script="Uigh" typeface="Microsoft Uighur"/>
+        <a:font script="Geor" typeface="Sylfaen"/>
+      </a:minorFont>
+    </a:fontScheme>
+    <a:fmtScheme name="Office">
+      <a:fillStyleLst>
+        <a:solidFill>
+          <a:schemeClr val="phClr"/>
+        </a:solidFill>
+        <a:gradFill rotWithShape="1">
+          <a:gsLst>
+            <a:gs pos="0">
+              <a:schemeClr val="phClr">
+                <a:tint val="50000"/>
+                <a:satMod val="300000"/>
+              </a:schemeClr>
+            </a:gs>
+            <a:gs pos="35000">
+              <a:schemeClr val="phClr">
+                <a:tint val="37000"/>
+                <a:satMod val="300000"/>
+              </a:schemeClr>
+            </a:gs>
+            <a:gs pos="100000">
+              <a:schemeClr val="phClr">
+                <a:tint val="15000"/>
+                <a:satMod val="350000"/>
+              </a:schemeClr>
+            </a:gs>
+          </a:gsLst>
+          <a:lin ang="16200000" scaled="1"/>
+        </a:gradFill>
+        <a:gradFill rotWithShape="1">
+          <a:gsLst>
+            <a:gs pos="0">
+              <a:schemeClr val="phClr">
+                <a:tint val="100000"/>
+                <a:shade val="100000"/>
+                <a:satMod val="130000"/>
+              </a:schemeClr>
+            </a:gs>
+            <a:gs pos="100000">
+              <a:schemeClr val="phClr">
+                <a:tint val="50000"/>
+                <a:shade val="100000"/>
+                <a:satMod val="350000"/>
+              </a:schemeClr>
+            </a:gs>
+          </a:gsLst>
+          <a:lin ang="16200000" scaled="0"/>
+        </a:gradFill>
+      </a:fillStyleLst>
+      <a:lnStyleLst>
+        <a:ln w="9525" cap="flat" cmpd="sng" algn="ctr">
+          <a:solidFill>
+            <a:schemeClr val="phClr">
+              <a:shade val="95000"/>
+              <a:satMod val="105000"/>
+            </a:schemeClr>
+          </a:solidFill>
+          <a:prstDash val="solid"/>
+        </a:ln>
+        <a:ln w="25400" cap="flat" cmpd="sng" algn="ctr">
+          <a:solidFill>
+            <a:schemeClr val="phClr"/>
+          </a:solidFill>
+          <a:prstDash val="solid"/>
+        </a:ln>
+        <a:ln w="38100" cap="flat" cmpd="sng" algn="ctr">
+          <a:solidFill>
+            <a:schemeClr val="phClr"/>
+          </a:solidFill>
+          <a:prstDash val="solid"/>
+        </a:ln>
+      </a:lnStyleLst>
+      <a:effectStyleLst>
+        <a:effectStyle>
+          <a:effectLst>
+            <a:outerShdw blurRad="40000" dist="20000" dir="5400000" rotWithShape="0">
+              <a:srgbClr val="000000">
+                <a:alpha val="38000"/>
+              </a:srgbClr>
+            </a:outerShdw>
+          </a:effectLst>
+        </a:effectStyle>
+        <a:effectStyle>
+          <a:effectLst>
+            <a:outerShdw blurRad="40000" dist="23000" dir="5400000" rotWithShape="0">
+              <a:srgbClr val="000000">
+                <a:alpha val="35000"/>
+              </a:srgbClr>
+            </a:outerShdw>
+          </a:effectLst>
+        </a:effectStyle>
+        <a:effectStyle>
+          <a:effectLst>
+            <a:outerShdw blurRad="40000" dist="23000" dir="5400000" rotWithShape="0">
+              <a:srgbClr val="000000">
+                <a:alpha val="35000"/>
+              </a:srgbClr>
+            </a:outerShdw>
+          </a:effectLst>
+          <a:scene3d>
+            <a:camera prst="orthographicFront">
+              <a:rot lat="0" lon="0" rev="0"/>
+            </a:camera>
+            <a:lightRig rig="threePt" dir="t">
+              <a:rot lat="0" lon="0" rev="1200000"/>
+            </a:lightRig>
+          </a:scene3d>
+          <a:sp3d>
+            <a:bevelT w="63500" h="25400"/>
+          </a:sp3d>
+        </a:effectStyle>
+      </a:effectStyleLst>
+      <a:bgFillStyleLst>
+        <a:solidFill>
+          <a:schemeClr val="phClr"/>
+        </a:solidFill>
+        <a:gradFill rotWithShape="1">
+          <a:gsLst>
+            <a:gs pos="0">
+              <a:schemeClr val="phClr">
+                <a:tint val="40000"/>
+                <a:satMod val="350000"/>
+              </a:schemeClr>
+            </a:gs>
+            <a:gs pos="40000">
+              <a:schemeClr val="phClr">
+                <a:tint val="45000"/>
+                <a:shade val="99000"/>
+                <a:satMod val="350000"/>
+              </a:schemeClr>
+            </a:gs>
+            <a:gs pos="100000">
+              <a:schemeClr val="phClr">
+                <a:shade val="20000"/>
+                <a:satMod val="255000"/>
+              </a:schemeClr>
+            </a:gs>
+          </a:gsLst>
+          <a:path path="circle">
+            <a:fillToRect l="50000" t="-80000" r="50000" b="180000"/>
+          </a:path>
+        </a:gradFill>
+        <a:gradFill rotWithShape="1">
+          <a:gsLst>
+            <a:gs pos="0">
+              <a:schemeClr val="phClr">
+                <a:tint val="80000"/>
+                <a:satMod val="300000"/>
+              </a:schemeClr>
+            </a:gs>
+            <a:gs pos="100000">
+              <a:schemeClr val="phClr">
+                <a:shade val="30000"/>
+                <a:satMod val="200000"/>
+              </a:schemeClr>
+            </a:gs>
+          </a:gsLst>
+          <a:path path="circle">
+            <a:fillToRect l="50000" t="50000" r="50000" b="50000"/>
+          </a:path>
+        </a:gradFill>
+      </a:bgFillStyleLst>
+    </a:fmtScheme>
+  </a:themeElements>
+</a:theme>
+</file>
+
+<file path=ppt/theme/theme2.xml><?xml version="1.0" encoding="utf-8"?>
 <a:theme xmlns:a="http://schemas.openxmlformats.org/drawingml/2006/main" xmlns:r="http://schemas.openxmlformats.org/officeDocument/2006/relationships">
   <a:themeElements>
     <a:clrScheme name="Default">
@@ -34915,283 +35580,4 @@
     </a:fmtScheme>
   </a:themeElements>
 </a:theme>
-</file>
-
-<file path=ppt/theme/theme2.xml><?xml version="1.0" encoding="utf-8"?>
-<a:theme xmlns:a="http://schemas.openxmlformats.org/drawingml/2006/main" xmlns:r="http://schemas.openxmlformats.org/officeDocument/2006/relationships" name="Investor Pitch">
-  <a:themeElements>
-    <a:clrScheme name="Simple Light">
-      <a:dk1>
-        <a:srgbClr val="1A36B4"/>
-      </a:dk1>
-      <a:lt1>
-        <a:srgbClr val="F6F5EC"/>
-      </a:lt1>
-      <a:dk2>
-        <a:srgbClr val="1D1D1D"/>
-      </a:dk2>
-      <a:lt2>
-        <a:srgbClr val="A4C2F4"/>
-      </a:lt2>
-      <a:accent1>
-        <a:srgbClr val="FFFFFF"/>
-      </a:accent1>
-      <a:accent2>
-        <a:srgbClr val="1A36B4"/>
-      </a:accent2>
-      <a:accent3>
-        <a:srgbClr val="1D1D1D"/>
-      </a:accent3>
-      <a:accent4>
-        <a:srgbClr val="F6F5EC"/>
-      </a:accent4>
-      <a:accent5>
-        <a:srgbClr val="1A36B4"/>
-      </a:accent5>
-      <a:accent6>
-        <a:srgbClr val="595959"/>
-      </a:accent6>
-      <a:hlink>
-        <a:srgbClr val="A4C2F4"/>
-      </a:hlink>
-      <a:folHlink>
-        <a:srgbClr val="0097A7"/>
-      </a:folHlink>
-    </a:clrScheme>
-    <a:fontScheme name="Office">
-      <a:majorFont>
-        <a:latin typeface="Arial"/>
-        <a:ea typeface=""/>
-        <a:cs typeface=""/>
-        <a:font script="Jpan" typeface="ＭＳ Ｐゴシック"/>
-        <a:font script="Hang" typeface="맑은 고딕"/>
-        <a:font script="Hans" typeface="宋体"/>
-        <a:font script="Hant" typeface="新細明體"/>
-        <a:font script="Arab" typeface="Times New Roman"/>
-        <a:font script="Hebr" typeface="Times New Roman"/>
-        <a:font script="Thai" typeface="Angsana New"/>
-        <a:font script="Ethi" typeface="Nyala"/>
-        <a:font script="Beng" typeface="Vrinda"/>
-        <a:font script="Gujr" typeface="Shruti"/>
-        <a:font script="Khmr" typeface="MoolBoran"/>
-        <a:font script="Knda" typeface="Tunga"/>
-        <a:font script="Guru" typeface="Raavi"/>
-        <a:font script="Cans" typeface="Euphemia"/>
-        <a:font script="Cher" typeface="Plantagenet Cherokee"/>
-        <a:font script="Yiii" typeface="Microsoft Yi Baiti"/>
-        <a:font script="Tibt" typeface="Microsoft Himalaya"/>
-        <a:font script="Thaa" typeface="MV Boli"/>
-        <a:font script="Deva" typeface="Mangal"/>
-        <a:font script="Telu" typeface="Gautami"/>
-        <a:font script="Taml" typeface="Latha"/>
-        <a:font script="Syrc" typeface="Estrangelo Edessa"/>
-        <a:font script="Orya" typeface="Kalinga"/>
-        <a:font script="Mlym" typeface="Kartika"/>
-        <a:font script="Laoo" typeface="DokChampa"/>
-        <a:font script="Sinh" typeface="Iskoola Pota"/>
-        <a:font script="Mong" typeface="Mongolian Baiti"/>
-        <a:font script="Viet" typeface="Times New Roman"/>
-        <a:font script="Uigh" typeface="Microsoft Uighur"/>
-        <a:font script="Geor" typeface="Sylfaen"/>
-      </a:majorFont>
-      <a:minorFont>
-        <a:latin typeface="Arial"/>
-        <a:ea typeface=""/>
-        <a:cs typeface=""/>
-        <a:font script="Jpan" typeface="ＭＳ Ｐゴシック"/>
-        <a:font script="Hang" typeface="맑은 고딕"/>
-        <a:font script="Hans" typeface="宋体"/>
-        <a:font script="Hant" typeface="新細明體"/>
-        <a:font script="Arab" typeface="Arial"/>
-        <a:font script="Hebr" typeface="Arial"/>
-        <a:font script="Thai" typeface="Cordia New"/>
-        <a:font script="Ethi" typeface="Nyala"/>
-        <a:font script="Beng" typeface="Vrinda"/>
-        <a:font script="Gujr" typeface="Shruti"/>
-        <a:font script="Khmr" typeface="DaunPenh"/>
-        <a:font script="Knda" typeface="Tunga"/>
-        <a:font script="Guru" typeface="Raavi"/>
-        <a:font script="Cans" typeface="Euphemia"/>
-        <a:font script="Cher" typeface="Plantagenet Cherokee"/>
-        <a:font script="Yiii" typeface="Microsoft Yi Baiti"/>
-        <a:font script="Tibt" typeface="Microsoft Himalaya"/>
-        <a:font script="Thaa" typeface="MV Boli"/>
-        <a:font script="Deva" typeface="Mangal"/>
-        <a:font script="Telu" typeface="Gautami"/>
-        <a:font script="Taml" typeface="Latha"/>
-        <a:font script="Syrc" typeface="Estrangelo Edessa"/>
-        <a:font script="Orya" typeface="Kalinga"/>
-        <a:font script="Mlym" typeface="Kartika"/>
-        <a:font script="Laoo" typeface="DokChampa"/>
-        <a:font script="Sinh" typeface="Iskoola Pota"/>
-        <a:font script="Mong" typeface="Mongolian Baiti"/>
-        <a:font script="Viet" typeface="Arial"/>
-        <a:font script="Uigh" typeface="Microsoft Uighur"/>
-        <a:font script="Geor" typeface="Sylfaen"/>
-      </a:minorFont>
-    </a:fontScheme>
-    <a:fmtScheme name="Office">
-      <a:fillStyleLst>
-        <a:solidFill>
-          <a:schemeClr val="phClr"/>
-        </a:solidFill>
-        <a:gradFill rotWithShape="1">
-          <a:gsLst>
-            <a:gs pos="0">
-              <a:schemeClr val="phClr">
-                <a:tint val="50000"/>
-                <a:satMod val="300000"/>
-              </a:schemeClr>
-            </a:gs>
-            <a:gs pos="35000">
-              <a:schemeClr val="phClr">
-                <a:tint val="37000"/>
-                <a:satMod val="300000"/>
-              </a:schemeClr>
-            </a:gs>
-            <a:gs pos="100000">
-              <a:schemeClr val="phClr">
-                <a:tint val="15000"/>
-                <a:satMod val="350000"/>
-              </a:schemeClr>
-            </a:gs>
-          </a:gsLst>
-          <a:lin ang="16200000" scaled="1"/>
-        </a:gradFill>
-        <a:gradFill rotWithShape="1">
-          <a:gsLst>
-            <a:gs pos="0">
-              <a:schemeClr val="phClr">
-                <a:tint val="100000"/>
-                <a:shade val="100000"/>
-                <a:satMod val="130000"/>
-              </a:schemeClr>
-            </a:gs>
-            <a:gs pos="100000">
-              <a:schemeClr val="phClr">
-                <a:tint val="50000"/>
-                <a:shade val="100000"/>
-                <a:satMod val="350000"/>
-              </a:schemeClr>
-            </a:gs>
-          </a:gsLst>
-          <a:lin ang="16200000" scaled="0"/>
-        </a:gradFill>
-      </a:fillStyleLst>
-      <a:lnStyleLst>
-        <a:ln w="9525" cap="flat" cmpd="sng" algn="ctr">
-          <a:solidFill>
-            <a:schemeClr val="phClr">
-              <a:shade val="95000"/>
-              <a:satMod val="105000"/>
-            </a:schemeClr>
-          </a:solidFill>
-          <a:prstDash val="solid"/>
-        </a:ln>
-        <a:ln w="25400" cap="flat" cmpd="sng" algn="ctr">
-          <a:solidFill>
-            <a:schemeClr val="phClr"/>
-          </a:solidFill>
-          <a:prstDash val="solid"/>
-        </a:ln>
-        <a:ln w="38100" cap="flat" cmpd="sng" algn="ctr">
-          <a:solidFill>
-            <a:schemeClr val="phClr"/>
-          </a:solidFill>
-          <a:prstDash val="solid"/>
-        </a:ln>
-      </a:lnStyleLst>
-      <a:effectStyleLst>
-        <a:effectStyle>
-          <a:effectLst>
-            <a:outerShdw blurRad="40000" dist="20000" dir="5400000" rotWithShape="0">
-              <a:srgbClr val="000000">
-                <a:alpha val="38000"/>
-              </a:srgbClr>
-            </a:outerShdw>
-          </a:effectLst>
-        </a:effectStyle>
-        <a:effectStyle>
-          <a:effectLst>
-            <a:outerShdw blurRad="40000" dist="23000" dir="5400000" rotWithShape="0">
-              <a:srgbClr val="000000">
-                <a:alpha val="35000"/>
-              </a:srgbClr>
-            </a:outerShdw>
-          </a:effectLst>
-        </a:effectStyle>
-        <a:effectStyle>
-          <a:effectLst>
-            <a:outerShdw blurRad="40000" dist="23000" dir="5400000" rotWithShape="0">
-              <a:srgbClr val="000000">
-                <a:alpha val="35000"/>
-              </a:srgbClr>
-            </a:outerShdw>
-          </a:effectLst>
-          <a:scene3d>
-            <a:camera prst="orthographicFront">
-              <a:rot lat="0" lon="0" rev="0"/>
-            </a:camera>
-            <a:lightRig rig="threePt" dir="t">
-              <a:rot lat="0" lon="0" rev="1200000"/>
-            </a:lightRig>
-          </a:scene3d>
-          <a:sp3d>
-            <a:bevelT w="63500" h="25400"/>
-          </a:sp3d>
-        </a:effectStyle>
-      </a:effectStyleLst>
-      <a:bgFillStyleLst>
-        <a:solidFill>
-          <a:schemeClr val="phClr"/>
-        </a:solidFill>
-        <a:gradFill rotWithShape="1">
-          <a:gsLst>
-            <a:gs pos="0">
-              <a:schemeClr val="phClr">
-                <a:tint val="40000"/>
-                <a:satMod val="350000"/>
-              </a:schemeClr>
-            </a:gs>
-            <a:gs pos="40000">
-              <a:schemeClr val="phClr">
-                <a:tint val="45000"/>
-                <a:shade val="99000"/>
-                <a:satMod val="350000"/>
-              </a:schemeClr>
-            </a:gs>
-            <a:gs pos="100000">
-              <a:schemeClr val="phClr">
-                <a:shade val="20000"/>
-                <a:satMod val="255000"/>
-              </a:schemeClr>
-            </a:gs>
-          </a:gsLst>
-          <a:path path="circle">
-            <a:fillToRect l="50000" t="-80000" r="50000" b="180000"/>
-          </a:path>
-        </a:gradFill>
-        <a:gradFill rotWithShape="1">
-          <a:gsLst>
-            <a:gs pos="0">
-              <a:schemeClr val="phClr">
-                <a:tint val="80000"/>
-                <a:satMod val="300000"/>
-              </a:schemeClr>
-            </a:gs>
-            <a:gs pos="100000">
-              <a:schemeClr val="phClr">
-                <a:shade val="30000"/>
-                <a:satMod val="200000"/>
-              </a:schemeClr>
-            </a:gs>
-          </a:gsLst>
-          <a:path path="circle">
-            <a:fillToRect l="50000" t="50000" r="50000" b="50000"/>
-          </a:path>
-        </a:gradFill>
-      </a:bgFillStyleLst>
-    </a:fmtScheme>
-  </a:themeElements>
-</a:theme>
 </file>
</xml_diff>